<commit_message>
adding citation network flow chart as new slide
</commit_message>
<xml_diff>
--- a/Documents/images/Search Flow Chart.pptx
+++ b/Documents/images/Search Flow Chart.pptx
@@ -6,6 +6,7 @@
   </p:sldMasterIdLst>
   <p:sldIdLst>
     <p:sldId id="256" r:id="rId2"/>
+    <p:sldId id="257" r:id="rId3"/>
   </p:sldIdLst>
   <p:sldSz cx="21607463" cy="10799763"/>
   <p:notesSz cx="6858000" cy="9144000"/>
@@ -136,8 +137,8 @@
         </p:nvSpPr>
         <p:spPr>
           <a:xfrm>
-            <a:off x="1620560" y="3354928"/>
-            <a:ext cx="18366343" cy="2314949"/>
+            <a:off x="1620562" y="3354930"/>
+            <a:ext cx="18366342" cy="2314949"/>
           </a:xfrm>
         </p:spPr>
         <p:txBody>
@@ -164,8 +165,8 @@
         </p:nvSpPr>
         <p:spPr>
           <a:xfrm>
-            <a:off x="3241120" y="6119867"/>
-            <a:ext cx="15125225" cy="2759939"/>
+            <a:off x="3241122" y="6119869"/>
+            <a:ext cx="15125226" cy="2759939"/>
           </a:xfrm>
         </p:spPr>
         <p:txBody>
@@ -548,8 +549,8 @@
         </p:nvSpPr>
         <p:spPr>
           <a:xfrm>
-            <a:off x="30846905" y="679985"/>
-            <a:ext cx="9569554" cy="14512182"/>
+            <a:off x="30846906" y="679985"/>
+            <a:ext cx="9569553" cy="14512182"/>
           </a:xfrm>
         </p:spPr>
         <p:txBody>
@@ -576,7 +577,7 @@
         </p:nvSpPr>
         <p:spPr>
           <a:xfrm>
-            <a:off x="2126987" y="679985"/>
+            <a:off x="2126988" y="679985"/>
             <a:ext cx="28359795" cy="14512182"/>
           </a:xfrm>
         </p:spPr>
@@ -898,8 +899,8 @@
         </p:nvSpPr>
         <p:spPr>
           <a:xfrm>
-            <a:off x="1706841" y="6939849"/>
-            <a:ext cx="18366343" cy="2144953"/>
+            <a:off x="1706841" y="6939851"/>
+            <a:ext cx="18366342" cy="2144953"/>
           </a:xfrm>
         </p:spPr>
         <p:txBody>
@@ -930,8 +931,8 @@
         </p:nvSpPr>
         <p:spPr>
           <a:xfrm>
-            <a:off x="1706841" y="4577402"/>
-            <a:ext cx="18366343" cy="2362447"/>
+            <a:off x="1706841" y="4577404"/>
+            <a:ext cx="18366342" cy="2362447"/>
           </a:xfrm>
         </p:spPr>
         <p:txBody>
@@ -1167,7 +1168,7 @@
         </p:nvSpPr>
         <p:spPr>
           <a:xfrm>
-            <a:off x="2126986" y="3967414"/>
+            <a:off x="2126985" y="3967414"/>
             <a:ext cx="18962798" cy="11224754"/>
           </a:xfrm>
         </p:spPr>
@@ -1432,8 +1433,8 @@
         </p:nvSpPr>
         <p:spPr>
           <a:xfrm>
-            <a:off x="1080374" y="432492"/>
-            <a:ext cx="19446716" cy="1799961"/>
+            <a:off x="1080375" y="432494"/>
+            <a:ext cx="19446715" cy="1799961"/>
           </a:xfrm>
         </p:spPr>
         <p:txBody>
@@ -1464,7 +1465,7 @@
         </p:nvSpPr>
         <p:spPr>
           <a:xfrm>
-            <a:off x="1080373" y="2417449"/>
+            <a:off x="1080374" y="2417451"/>
             <a:ext cx="9547049" cy="1007477"/>
           </a:xfrm>
         </p:spPr>
@@ -1529,7 +1530,7 @@
         </p:nvSpPr>
         <p:spPr>
           <a:xfrm>
-            <a:off x="1080373" y="3424925"/>
+            <a:off x="1080374" y="3424925"/>
             <a:ext cx="9547049" cy="6222364"/>
           </a:xfrm>
         </p:spPr>
@@ -1614,7 +1615,7 @@
         </p:nvSpPr>
         <p:spPr>
           <a:xfrm>
-            <a:off x="10976293" y="2417449"/>
+            <a:off x="10976293" y="2417451"/>
             <a:ext cx="9550798" cy="1007477"/>
           </a:xfrm>
         </p:spPr>
@@ -2104,7 +2105,7 @@
         </p:nvSpPr>
         <p:spPr>
           <a:xfrm>
-            <a:off x="8447917" y="429992"/>
+            <a:off x="8447917" y="429994"/>
             <a:ext cx="12079173" cy="9217299"/>
           </a:xfrm>
         </p:spPr>
@@ -2442,7 +2443,7 @@
         </p:nvSpPr>
         <p:spPr>
           <a:xfrm>
-            <a:off x="4235214" y="8452317"/>
+            <a:off x="4235214" y="8452319"/>
             <a:ext cx="12964478" cy="1267471"/>
           </a:xfrm>
         </p:spPr>
@@ -2607,8 +2608,8 @@
         </p:nvSpPr>
         <p:spPr>
           <a:xfrm>
-            <a:off x="1080374" y="432492"/>
-            <a:ext cx="19446716" cy="1799961"/>
+            <a:off x="1080375" y="432494"/>
+            <a:ext cx="19446715" cy="1799961"/>
           </a:xfrm>
           <a:prstGeom prst="rect">
             <a:avLst/>
@@ -2640,8 +2641,8 @@
         </p:nvSpPr>
         <p:spPr>
           <a:xfrm>
-            <a:off x="1080374" y="2519946"/>
-            <a:ext cx="19446716" cy="7127344"/>
+            <a:off x="1080375" y="2519946"/>
+            <a:ext cx="19446715" cy="7127344"/>
           </a:xfrm>
           <a:prstGeom prst="rect">
             <a:avLst/>
@@ -2702,7 +2703,7 @@
         </p:nvSpPr>
         <p:spPr>
           <a:xfrm>
-            <a:off x="1080373" y="10009782"/>
+            <a:off x="1080374" y="10009784"/>
             <a:ext cx="5041742" cy="574987"/>
           </a:xfrm>
           <a:prstGeom prst="rect">
@@ -2743,7 +2744,7 @@
         </p:nvSpPr>
         <p:spPr>
           <a:xfrm>
-            <a:off x="7382551" y="10009782"/>
+            <a:off x="7382553" y="10009784"/>
             <a:ext cx="6842363" cy="574987"/>
           </a:xfrm>
           <a:prstGeom prst="rect">
@@ -2780,7 +2781,7 @@
         </p:nvSpPr>
         <p:spPr>
           <a:xfrm>
-            <a:off x="15485348" y="10009782"/>
+            <a:off x="15485349" y="10009784"/>
             <a:ext cx="5041742" cy="574987"/>
           </a:xfrm>
           <a:prstGeom prst="rect">
@@ -3108,7 +3109,7 @@
         </p:nvSpPr>
         <p:spPr>
           <a:xfrm>
-            <a:off x="1220128" y="128441"/>
+            <a:off x="1220128" y="128443"/>
             <a:ext cx="2583610" cy="461665"/>
           </a:xfrm>
           <a:prstGeom prst="rect">
@@ -3146,7 +3147,7 @@
         </p:nvSpPr>
         <p:spPr>
           <a:xfrm>
-            <a:off x="1245111" y="1319626"/>
+            <a:off x="1245111" y="1319627"/>
             <a:ext cx="2217674" cy="830997"/>
           </a:xfrm>
           <a:prstGeom prst="rect">
@@ -3202,7 +3203,7 @@
         </p:nvSpPr>
         <p:spPr>
           <a:xfrm>
-            <a:off x="5646778" y="1919790"/>
+            <a:off x="5646778" y="1919792"/>
             <a:ext cx="1599266" cy="461665"/>
           </a:xfrm>
           <a:prstGeom prst="rect">
@@ -3240,7 +3241,7 @@
         </p:nvSpPr>
         <p:spPr>
           <a:xfrm>
-            <a:off x="8803645" y="2161957"/>
+            <a:off x="8803646" y="2161959"/>
             <a:ext cx="1116712" cy="461665"/>
           </a:xfrm>
           <a:prstGeom prst="rect">
@@ -3278,7 +3279,7 @@
         </p:nvSpPr>
         <p:spPr>
           <a:xfrm>
-            <a:off x="146611" y="802571"/>
+            <a:off x="146610" y="802573"/>
             <a:ext cx="1945214" cy="461665"/>
           </a:xfrm>
           <a:prstGeom prst="rect">
@@ -3316,7 +3317,7 @@
         </p:nvSpPr>
         <p:spPr>
           <a:xfrm>
-            <a:off x="8803645" y="4044979"/>
+            <a:off x="8803647" y="4044981"/>
             <a:ext cx="2589471" cy="461665"/>
           </a:xfrm>
           <a:prstGeom prst="rect">
@@ -3355,14 +3356,16 @@
         </p:nvSpPr>
         <p:spPr>
           <a:xfrm>
-            <a:off x="8380110" y="993553"/>
+            <a:off x="8380110" y="993555"/>
             <a:ext cx="2368858" cy="461665"/>
           </a:xfrm>
           <a:prstGeom prst="rect">
             <a:avLst/>
           </a:prstGeom>
           <a:solidFill>
-            <a:srgbClr val="C3D69B"/>
+            <a:schemeClr val="bg1">
+              <a:lumMod val="85000"/>
+            </a:schemeClr>
           </a:solidFill>
         </p:spPr>
         <p:txBody>
@@ -3391,7 +3394,7 @@
         </p:nvSpPr>
         <p:spPr>
           <a:xfrm>
-            <a:off x="60433" y="6559909"/>
+            <a:off x="60435" y="6559909"/>
             <a:ext cx="1800493" cy="461665"/>
           </a:xfrm>
           <a:prstGeom prst="rect">
@@ -3431,7 +3434,7 @@
         </p:nvSpPr>
         <p:spPr>
           <a:xfrm>
-            <a:off x="1767061" y="6576415"/>
+            <a:off x="1767061" y="6576417"/>
             <a:ext cx="1609184" cy="461665"/>
           </a:xfrm>
           <a:prstGeom prst="rect">
@@ -3477,7 +3480,7 @@
         </p:nvSpPr>
         <p:spPr>
           <a:xfrm>
-            <a:off x="5046581" y="6160916"/>
+            <a:off x="5046580" y="6160916"/>
             <a:ext cx="2147944" cy="830997"/>
           </a:xfrm>
           <a:prstGeom prst="rect">
@@ -3521,8 +3524,8 @@
         </p:nvGrpSpPr>
         <p:grpSpPr>
           <a:xfrm>
-            <a:off x="5087306" y="7650966"/>
-            <a:ext cx="2107219" cy="1384995"/>
+            <a:off x="5087305" y="7650968"/>
+            <a:ext cx="2107218" cy="1384995"/>
             <a:chOff x="6870166" y="6716593"/>
             <a:chExt cx="1755783" cy="1384995"/>
           </a:xfrm>
@@ -3569,7 +3572,7 @@
           </p:nvSpPr>
           <p:spPr>
             <a:xfrm>
-              <a:off x="6970932" y="7178258"/>
+              <a:off x="6970931" y="7178258"/>
               <a:ext cx="1613159" cy="461665"/>
             </a:xfrm>
             <a:prstGeom prst="rect">
@@ -3632,7 +3635,7 @@
         </p:nvGrpSpPr>
         <p:grpSpPr>
           <a:xfrm>
-            <a:off x="533610" y="2662606"/>
+            <a:off x="533611" y="2662607"/>
             <a:ext cx="2981255" cy="752565"/>
             <a:chOff x="622313" y="3146861"/>
             <a:chExt cx="2484051" cy="752565"/>
@@ -3646,7 +3649,7 @@
           </p:nvSpPr>
           <p:spPr>
             <a:xfrm>
-              <a:off x="1280155" y="3146861"/>
+              <a:off x="1280154" y="3146861"/>
               <a:ext cx="1401916" cy="461665"/>
             </a:xfrm>
             <a:prstGeom prst="rect">
@@ -3711,7 +3714,7 @@
         </p:nvSpPr>
         <p:spPr>
           <a:xfrm>
-            <a:off x="999723" y="4202449"/>
+            <a:off x="999724" y="4202451"/>
             <a:ext cx="3143859" cy="461665"/>
           </a:xfrm>
           <a:prstGeom prst="rect">
@@ -3741,7 +3744,7 @@
         </p:nvSpPr>
         <p:spPr>
           <a:xfrm>
-            <a:off x="1245111" y="5181778"/>
+            <a:off x="1245113" y="5181780"/>
             <a:ext cx="2453767" cy="461665"/>
           </a:xfrm>
           <a:prstGeom prst="rect">
@@ -3779,7 +3782,7 @@
         </p:nvSpPr>
         <p:spPr>
           <a:xfrm>
-            <a:off x="16468818" y="9469993"/>
+            <a:off x="16468817" y="9469995"/>
             <a:ext cx="5012460" cy="461665"/>
           </a:xfrm>
           <a:prstGeom prst="rect">
@@ -3813,7 +3816,7 @@
         </p:nvSpPr>
         <p:spPr>
           <a:xfrm>
-            <a:off x="17501095" y="10104090"/>
+            <a:off x="17501095" y="10104092"/>
             <a:ext cx="3953276" cy="461665"/>
           </a:xfrm>
           <a:prstGeom prst="rect">
@@ -3847,7 +3850,7 @@
         </p:nvCxnSpPr>
         <p:spPr>
           <a:xfrm>
-            <a:off x="6661352" y="2367195"/>
+            <a:off x="6661354" y="2367197"/>
             <a:ext cx="2142293" cy="1908617"/>
           </a:xfrm>
           <a:prstGeom prst="straightConnector1">
@@ -3886,7 +3889,7 @@
         <p:spPr>
           <a:xfrm flipH="1">
             <a:off x="7398444" y="1319626"/>
-            <a:ext cx="981666" cy="752564"/>
+            <a:ext cx="981667" cy="752564"/>
           </a:xfrm>
           <a:prstGeom prst="straightConnector1">
             <a:avLst/>
@@ -3926,8 +3929,8 @@
         </p:nvCxnSpPr>
         <p:spPr>
           <a:xfrm flipH="1" flipV="1">
-            <a:off x="7246044" y="2150623"/>
-            <a:ext cx="1557601" cy="242167"/>
+            <a:off x="7246044" y="2150625"/>
+            <a:ext cx="1557602" cy="242167"/>
           </a:xfrm>
           <a:prstGeom prst="straightConnector1">
             <a:avLst/>
@@ -3964,8 +3967,8 @@
         </p:nvCxnSpPr>
         <p:spPr>
           <a:xfrm flipH="1">
-            <a:off x="4143582" y="2367195"/>
-            <a:ext cx="2218712" cy="1702998"/>
+            <a:off x="4143583" y="2367195"/>
+            <a:ext cx="2218713" cy="1702998"/>
           </a:xfrm>
           <a:prstGeom prst="straightConnector1">
             <a:avLst/>
@@ -4005,8 +4008,8 @@
         </p:nvCxnSpPr>
         <p:spPr>
           <a:xfrm flipH="1">
-            <a:off x="3005646" y="2150623"/>
-            <a:ext cx="2641132" cy="742816"/>
+            <a:off x="3005647" y="2150625"/>
+            <a:ext cx="2641131" cy="742815"/>
           </a:xfrm>
           <a:prstGeom prst="straightConnector1">
             <a:avLst/>
@@ -4045,8 +4048,8 @@
         </p:nvCxnSpPr>
         <p:spPr>
           <a:xfrm>
-            <a:off x="2164386" y="1919790"/>
-            <a:ext cx="0" cy="742816"/>
+            <a:off x="2164386" y="2096099"/>
+            <a:ext cx="0" cy="566508"/>
           </a:xfrm>
           <a:prstGeom prst="straightConnector1">
             <a:avLst/>
@@ -4083,7 +4086,7 @@
         </p:nvCxnSpPr>
         <p:spPr>
           <a:xfrm>
-            <a:off x="2392144" y="4656457"/>
+            <a:off x="2392145" y="4656457"/>
             <a:ext cx="0" cy="596396"/>
           </a:xfrm>
           <a:prstGeom prst="straightConnector1">
@@ -4121,7 +4124,7 @@
         </p:nvCxnSpPr>
         <p:spPr>
           <a:xfrm>
-            <a:off x="2571653" y="5543752"/>
+            <a:off x="2571653" y="5543753"/>
             <a:ext cx="0" cy="1032663"/>
           </a:xfrm>
           <a:prstGeom prst="straightConnector1">
@@ -4159,8 +4162,8 @@
         </p:nvCxnSpPr>
         <p:spPr>
           <a:xfrm flipV="1">
-            <a:off x="3466671" y="6716594"/>
-            <a:ext cx="1606685" cy="138612"/>
+            <a:off x="3466672" y="6716594"/>
+            <a:ext cx="1606684" cy="138612"/>
           </a:xfrm>
           <a:prstGeom prst="straightConnector1">
             <a:avLst/>
@@ -4198,9 +4201,9 @@
           <p:nvPr/>
         </p:nvCxnSpPr>
         <p:spPr>
-          <a:xfrm>
-            <a:off x="6140916" y="6855206"/>
-            <a:ext cx="0" cy="795760"/>
+          <a:xfrm flipH="1">
+            <a:off x="6140915" y="6855207"/>
+            <a:ext cx="1" cy="795761"/>
           </a:xfrm>
           <a:prstGeom prst="straightConnector1">
             <a:avLst/>
@@ -4237,8 +4240,8 @@
         </p:nvSpPr>
         <p:spPr>
           <a:xfrm rot="7367939" flipH="1">
-            <a:off x="3375337" y="6565129"/>
-            <a:ext cx="753278" cy="2394761"/>
+            <a:off x="3375337" y="6565130"/>
+            <a:ext cx="753278" cy="2394762"/>
           </a:xfrm>
           <a:custGeom>
             <a:avLst/>
@@ -4320,8 +4323,8 @@
         </p:nvCxnSpPr>
         <p:spPr>
           <a:xfrm flipH="1">
-            <a:off x="9560718" y="1455218"/>
-            <a:ext cx="359639" cy="706739"/>
+            <a:off x="9560721" y="1455218"/>
+            <a:ext cx="359638" cy="706739"/>
           </a:xfrm>
           <a:prstGeom prst="straightConnector1">
             <a:avLst/>
@@ -4361,7 +4364,7 @@
         <p:spPr>
           <a:xfrm>
             <a:off x="2353948" y="590106"/>
-            <a:ext cx="0" cy="729520"/>
+            <a:ext cx="0" cy="729521"/>
           </a:xfrm>
           <a:prstGeom prst="straightConnector1">
             <a:avLst/>
@@ -4398,8 +4401,8 @@
         </p:nvCxnSpPr>
         <p:spPr>
           <a:xfrm>
-            <a:off x="7246044" y="8228978"/>
-            <a:ext cx="1421353" cy="0"/>
+            <a:off x="7246047" y="8228978"/>
+            <a:ext cx="1421352" cy="0"/>
           </a:xfrm>
           <a:prstGeom prst="straightConnector1">
             <a:avLst/>
@@ -4436,7 +4439,7 @@
         </p:nvSpPr>
         <p:spPr>
           <a:xfrm>
-            <a:off x="8915006" y="7998141"/>
+            <a:off x="8915008" y="7998143"/>
             <a:ext cx="3449231" cy="461665"/>
           </a:xfrm>
           <a:prstGeom prst="rect">
@@ -4466,7 +4469,7 @@
         </p:nvSpPr>
         <p:spPr>
           <a:xfrm>
-            <a:off x="11131643" y="6807247"/>
+            <a:off x="11131643" y="6807249"/>
             <a:ext cx="2465188" cy="461665"/>
           </a:xfrm>
           <a:prstGeom prst="rect">
@@ -4496,7 +4499,7 @@
         </p:nvCxnSpPr>
         <p:spPr>
           <a:xfrm flipH="1">
-            <a:off x="10787427" y="7392079"/>
+            <a:off x="10787427" y="7392081"/>
             <a:ext cx="958468" cy="517773"/>
           </a:xfrm>
           <a:prstGeom prst="straightConnector1">
@@ -4534,7 +4537,7 @@
         </p:nvSpPr>
         <p:spPr>
           <a:xfrm>
-            <a:off x="8116368" y="9239161"/>
+            <a:off x="8116371" y="9239163"/>
             <a:ext cx="4595429" cy="461665"/>
           </a:xfrm>
           <a:prstGeom prst="rect">
@@ -4572,8 +4575,8 @@
         </p:nvCxnSpPr>
         <p:spPr>
           <a:xfrm flipH="1">
-            <a:off x="10246222" y="8459806"/>
-            <a:ext cx="46900" cy="806987"/>
+            <a:off x="10246223" y="8459808"/>
+            <a:ext cx="46899" cy="806987"/>
           </a:xfrm>
           <a:prstGeom prst="straightConnector1">
             <a:avLst/>
@@ -4610,7 +4613,7 @@
         </p:nvCxnSpPr>
         <p:spPr>
           <a:xfrm flipV="1">
-            <a:off x="12364237" y="8805128"/>
+            <a:off x="12364238" y="8805130"/>
             <a:ext cx="1455575" cy="556499"/>
           </a:xfrm>
           <a:prstGeom prst="straightConnector1">
@@ -4648,7 +4651,7 @@
         </p:nvSpPr>
         <p:spPr>
           <a:xfrm>
-            <a:off x="13137701" y="7479042"/>
+            <a:off x="13137703" y="7479042"/>
             <a:ext cx="2578651" cy="1569660"/>
           </a:xfrm>
           <a:prstGeom prst="rect">
@@ -4704,7 +4707,7 @@
         </p:nvSpPr>
         <p:spPr>
           <a:xfrm>
-            <a:off x="8086758" y="6585986"/>
+            <a:off x="8086759" y="6585988"/>
             <a:ext cx="2403222" cy="830997"/>
           </a:xfrm>
           <a:prstGeom prst="rect">
@@ -4750,8 +4753,8 @@
         </p:nvCxnSpPr>
         <p:spPr>
           <a:xfrm>
-            <a:off x="9288369" y="7416983"/>
-            <a:ext cx="727456" cy="438970"/>
+            <a:off x="9288370" y="7416985"/>
+            <a:ext cx="727455" cy="438969"/>
           </a:xfrm>
           <a:prstGeom prst="straightConnector1">
             <a:avLst/>
@@ -4788,8 +4791,8 @@
         </p:nvCxnSpPr>
         <p:spPr>
           <a:xfrm flipV="1">
-            <a:off x="15165267" y="6290390"/>
-            <a:ext cx="551085" cy="1017451"/>
+            <a:off x="15165270" y="6290392"/>
+            <a:ext cx="551084" cy="1017451"/>
           </a:xfrm>
           <a:prstGeom prst="straightConnector1">
             <a:avLst/>
@@ -4826,7 +4829,7 @@
         </p:nvGrpSpPr>
         <p:grpSpPr>
           <a:xfrm>
-            <a:off x="15215972" y="5439058"/>
+            <a:off x="15215976" y="5439058"/>
             <a:ext cx="1505039" cy="851332"/>
             <a:chOff x="16669296" y="9124575"/>
             <a:chExt cx="1505039" cy="851332"/>
@@ -4917,7 +4920,7 @@
         </p:nvSpPr>
         <p:spPr>
           <a:xfrm>
-            <a:off x="16190326" y="4425624"/>
+            <a:off x="16190327" y="4425626"/>
             <a:ext cx="2263510" cy="461665"/>
           </a:xfrm>
           <a:prstGeom prst="rect">
@@ -4951,7 +4954,7 @@
         </p:nvCxnSpPr>
         <p:spPr>
           <a:xfrm flipV="1">
-            <a:off x="17654498" y="3415171"/>
+            <a:off x="17654499" y="3415171"/>
             <a:ext cx="199205" cy="1010454"/>
           </a:xfrm>
           <a:prstGeom prst="straightConnector1">
@@ -4989,8 +4992,8 @@
         </p:nvSpPr>
         <p:spPr>
           <a:xfrm>
-            <a:off x="18198583" y="3306316"/>
-            <a:ext cx="3473276" cy="1200328"/>
+            <a:off x="18198584" y="3306316"/>
+            <a:ext cx="3432099" cy="1200328"/>
           </a:xfrm>
           <a:prstGeom prst="rect">
             <a:avLst/>
@@ -5041,7 +5044,7 @@
         </p:nvCxnSpPr>
         <p:spPr>
           <a:xfrm flipV="1">
-            <a:off x="16443592" y="4887289"/>
+            <a:off x="16443593" y="4887291"/>
             <a:ext cx="878489" cy="656463"/>
           </a:xfrm>
           <a:prstGeom prst="straightConnector1">
@@ -5079,7 +5082,7 @@
         </p:nvSpPr>
         <p:spPr>
           <a:xfrm>
-            <a:off x="17238166" y="2953506"/>
+            <a:off x="17238167" y="2953508"/>
             <a:ext cx="1659679" cy="461665"/>
           </a:xfrm>
           <a:prstGeom prst="rect">
@@ -5109,8 +5112,8 @@
         </p:nvSpPr>
         <p:spPr>
           <a:xfrm>
-            <a:off x="199204" y="1742901"/>
-            <a:ext cx="1020924" cy="2763743"/>
+            <a:off x="199205" y="1742903"/>
+            <a:ext cx="1020923" cy="2763743"/>
           </a:xfrm>
           <a:custGeom>
             <a:avLst/>
@@ -5212,7 +5215,7 @@
         </p:nvSpPr>
         <p:spPr>
           <a:xfrm>
-            <a:off x="18020742" y="2096097"/>
+            <a:off x="18020742" y="2096099"/>
             <a:ext cx="1754206" cy="830997"/>
           </a:xfrm>
           <a:prstGeom prst="rect">
@@ -5260,7 +5263,7 @@
         </p:nvSpPr>
         <p:spPr>
           <a:xfrm>
-            <a:off x="19624259" y="2010428"/>
+            <a:off x="19624260" y="2010428"/>
             <a:ext cx="1980029" cy="1200328"/>
           </a:xfrm>
           <a:prstGeom prst="rect">
@@ -5311,7 +5314,7 @@
         </p:nvSpPr>
         <p:spPr>
           <a:xfrm>
-            <a:off x="12047937" y="26964"/>
+            <a:off x="12047938" y="26964"/>
             <a:ext cx="4673074" cy="3785652"/>
           </a:xfrm>
           <a:prstGeom prst="rect">
@@ -5505,7 +5508,7 @@
         </p:nvCxnSpPr>
         <p:spPr>
           <a:xfrm flipH="1" flipV="1">
-            <a:off x="16721011" y="802571"/>
+            <a:off x="16721012" y="802571"/>
             <a:ext cx="1085887" cy="2321701"/>
           </a:xfrm>
           <a:prstGeom prst="straightConnector1">
@@ -5543,7 +5546,7 @@
         </p:nvSpPr>
         <p:spPr>
           <a:xfrm>
-            <a:off x="19522405" y="8817869"/>
+            <a:off x="19522406" y="8817871"/>
             <a:ext cx="1119417" cy="461665"/>
           </a:xfrm>
           <a:prstGeom prst="rect">
@@ -5581,7 +5584,7 @@
         </p:nvSpPr>
         <p:spPr>
           <a:xfrm>
-            <a:off x="18172855" y="8459806"/>
+            <a:off x="18172856" y="8459808"/>
             <a:ext cx="2902808" cy="461665"/>
           </a:xfrm>
           <a:prstGeom prst="rect">
@@ -5615,7 +5618,7 @@
         </p:nvSpPr>
         <p:spPr>
           <a:xfrm>
-            <a:off x="16635934" y="7679019"/>
+            <a:off x="16635935" y="7679021"/>
             <a:ext cx="1170964" cy="461665"/>
           </a:xfrm>
           <a:prstGeom prst="rect">
@@ -5647,8 +5650,8 @@
         </p:nvSpPr>
         <p:spPr>
           <a:xfrm>
-            <a:off x="16443592" y="7479042"/>
-            <a:ext cx="5138218" cy="3271162"/>
+            <a:off x="16443593" y="7479042"/>
+            <a:ext cx="5138217" cy="3271162"/>
           </a:xfrm>
           <a:prstGeom prst="rect">
             <a:avLst/>
@@ -5695,8 +5698,8 @@
         </p:nvCxnSpPr>
         <p:spPr>
           <a:xfrm>
-            <a:off x="11393116" y="4275812"/>
-            <a:ext cx="4797210" cy="380645"/>
+            <a:off x="11393118" y="4275814"/>
+            <a:ext cx="4797209" cy="380645"/>
           </a:xfrm>
           <a:prstGeom prst="straightConnector1">
             <a:avLst/>
@@ -5729,6 +5732,592 @@
     <p:extLst>
       <p:ext uri="{BB962C8B-B14F-4D97-AF65-F5344CB8AC3E}">
         <p14:creationId xmlns:p14="http://schemas.microsoft.com/office/powerpoint/2010/main" val="2683672657"/>
+      </p:ext>
+    </p:extLst>
+  </p:cSld>
+  <p:clrMapOvr>
+    <a:masterClrMapping/>
+  </p:clrMapOvr>
+</p:sld>
+</file>
+
+<file path=ppt/slides/slide2.xml><?xml version="1.0" encoding="utf-8"?>
+<p:sld xmlns:a="http://schemas.openxmlformats.org/drawingml/2006/main" xmlns:r="http://schemas.openxmlformats.org/officeDocument/2006/relationships" xmlns:p="http://schemas.openxmlformats.org/presentationml/2006/main">
+  <p:cSld>
+    <p:spTree>
+      <p:nvGrpSpPr>
+        <p:cNvPr id="1" name=""/>
+        <p:cNvGrpSpPr/>
+        <p:nvPr/>
+      </p:nvGrpSpPr>
+      <p:grpSpPr>
+        <a:xfrm>
+          <a:off x="0" y="0"/>
+          <a:ext cx="0" cy="0"/>
+          <a:chOff x="0" y="0"/>
+          <a:chExt cx="0" cy="0"/>
+        </a:xfrm>
+      </p:grpSpPr>
+      <p:sp>
+        <p:nvSpPr>
+          <p:cNvPr id="66" name="TextBox 65"/>
+          <p:cNvSpPr txBox="1"/>
+          <p:nvPr/>
+        </p:nvSpPr>
+        <p:spPr>
+          <a:xfrm>
+            <a:off x="466363" y="2926244"/>
+            <a:ext cx="2683006" cy="1569660"/>
+          </a:xfrm>
+          <a:prstGeom prst="rect">
+            <a:avLst/>
+          </a:prstGeom>
+          <a:noFill/>
+        </p:spPr>
+        <p:txBody>
+          <a:bodyPr wrap="square" rtlCol="0">
+            <a:spAutoFit/>
+          </a:bodyPr>
+          <a:lstStyle/>
+          <a:p>
+            <a:r>
+              <a:rPr lang="en-US" sz="2400" dirty="0" smtClean="0"/>
+              <a:t>Identify seed articles </a:t>
+            </a:r>
+            <a:r>
+              <a:rPr lang="en-US" sz="2400" dirty="0" smtClean="0"/>
+              <a:t>based on scoping search o</a:t>
+            </a:r>
+            <a:r>
+              <a:rPr lang="en-US" sz="2400" dirty="0" smtClean="0"/>
+              <a:t>r previous review</a:t>
+            </a:r>
+            <a:endParaRPr lang="en-US" sz="2400" dirty="0"/>
+          </a:p>
+        </p:txBody>
+      </p:sp>
+      <p:sp>
+        <p:nvSpPr>
+          <p:cNvPr id="67" name="TextBox 66"/>
+          <p:cNvSpPr txBox="1"/>
+          <p:nvPr/>
+        </p:nvSpPr>
+        <p:spPr>
+          <a:xfrm>
+            <a:off x="4343081" y="3110910"/>
+            <a:ext cx="2683006" cy="1200328"/>
+          </a:xfrm>
+          <a:prstGeom prst="rect">
+            <a:avLst/>
+          </a:prstGeom>
+          <a:noFill/>
+        </p:spPr>
+        <p:txBody>
+          <a:bodyPr wrap="square" rtlCol="0">
+            <a:spAutoFit/>
+          </a:bodyPr>
+          <a:lstStyle/>
+          <a:p>
+            <a:r>
+              <a:rPr lang="en-US" sz="2400" dirty="0" smtClean="0"/>
+              <a:t>Generate citation networks for all seed articles</a:t>
+            </a:r>
+            <a:endParaRPr lang="en-US" sz="2400" dirty="0"/>
+          </a:p>
+        </p:txBody>
+      </p:sp>
+      <p:sp>
+        <p:nvSpPr>
+          <p:cNvPr id="70" name="TextBox 69"/>
+          <p:cNvSpPr txBox="1"/>
+          <p:nvPr/>
+        </p:nvSpPr>
+        <p:spPr>
+          <a:xfrm>
+            <a:off x="8181030" y="3295575"/>
+            <a:ext cx="2683006" cy="830997"/>
+          </a:xfrm>
+          <a:prstGeom prst="rect">
+            <a:avLst/>
+          </a:prstGeom>
+          <a:noFill/>
+        </p:spPr>
+        <p:txBody>
+          <a:bodyPr wrap="square" rtlCol="0">
+            <a:spAutoFit/>
+          </a:bodyPr>
+          <a:lstStyle/>
+          <a:p>
+            <a:r>
+              <a:rPr lang="en-US" sz="2400" dirty="0" smtClean="0"/>
+              <a:t>[reduce network by centrality]</a:t>
+            </a:r>
+            <a:endParaRPr lang="en-US" sz="2400" dirty="0"/>
+          </a:p>
+        </p:txBody>
+      </p:sp>
+      <p:sp>
+        <p:nvSpPr>
+          <p:cNvPr id="71" name="TextBox 70"/>
+          <p:cNvSpPr txBox="1"/>
+          <p:nvPr/>
+        </p:nvSpPr>
+        <p:spPr>
+          <a:xfrm>
+            <a:off x="10831666" y="1861007"/>
+            <a:ext cx="5924131" cy="830997"/>
+          </a:xfrm>
+          <a:prstGeom prst="rect">
+            <a:avLst/>
+          </a:prstGeom>
+          <a:noFill/>
+        </p:spPr>
+        <p:txBody>
+          <a:bodyPr wrap="square" rtlCol="0">
+            <a:spAutoFit/>
+          </a:bodyPr>
+          <a:lstStyle/>
+          <a:p>
+            <a:r>
+              <a:rPr lang="en-US" sz="2400" dirty="0"/>
+              <a:t>g</a:t>
+            </a:r>
+            <a:r>
+              <a:rPr lang="en-US" sz="2400" dirty="0" smtClean="0"/>
+              <a:t>enerate an author co-occurrence network from network</a:t>
+            </a:r>
+            <a:endParaRPr lang="en-US" sz="2400" dirty="0"/>
+          </a:p>
+        </p:txBody>
+      </p:sp>
+      <p:sp>
+        <p:nvSpPr>
+          <p:cNvPr id="73" name="TextBox 72"/>
+          <p:cNvSpPr txBox="1"/>
+          <p:nvPr/>
+        </p:nvSpPr>
+        <p:spPr>
+          <a:xfrm>
+            <a:off x="11523792" y="4467103"/>
+            <a:ext cx="2683006" cy="830997"/>
+          </a:xfrm>
+          <a:prstGeom prst="rect">
+            <a:avLst/>
+          </a:prstGeom>
+          <a:noFill/>
+        </p:spPr>
+        <p:txBody>
+          <a:bodyPr wrap="square" rtlCol="0">
+            <a:spAutoFit/>
+          </a:bodyPr>
+          <a:lstStyle/>
+          <a:p>
+            <a:r>
+              <a:rPr lang="en-US" sz="2400" dirty="0" smtClean="0"/>
+              <a:t>Identify relevant article topic clusters</a:t>
+            </a:r>
+            <a:endParaRPr lang="en-US" sz="2400" dirty="0"/>
+          </a:p>
+        </p:txBody>
+      </p:sp>
+      <p:sp>
+        <p:nvSpPr>
+          <p:cNvPr id="74" name="TextBox 73"/>
+          <p:cNvSpPr txBox="1"/>
+          <p:nvPr/>
+        </p:nvSpPr>
+        <p:spPr>
+          <a:xfrm>
+            <a:off x="15786081" y="4389753"/>
+            <a:ext cx="2683006" cy="830997"/>
+          </a:xfrm>
+          <a:prstGeom prst="rect">
+            <a:avLst/>
+          </a:prstGeom>
+          <a:noFill/>
+        </p:spPr>
+        <p:txBody>
+          <a:bodyPr wrap="square" rtlCol="0">
+            <a:spAutoFit/>
+          </a:bodyPr>
+          <a:lstStyle/>
+          <a:p>
+            <a:r>
+              <a:rPr lang="en-US" sz="2400" dirty="0" smtClean="0"/>
+              <a:t>Suggest potential articles</a:t>
+            </a:r>
+            <a:endParaRPr lang="en-US" sz="2400" dirty="0"/>
+          </a:p>
+        </p:txBody>
+      </p:sp>
+      <p:sp>
+        <p:nvSpPr>
+          <p:cNvPr id="76" name="TextBox 75"/>
+          <p:cNvSpPr txBox="1"/>
+          <p:nvPr/>
+        </p:nvSpPr>
+        <p:spPr>
+          <a:xfrm>
+            <a:off x="18921282" y="4453379"/>
+            <a:ext cx="2683006" cy="830997"/>
+          </a:xfrm>
+          <a:prstGeom prst="rect">
+            <a:avLst/>
+          </a:prstGeom>
+          <a:noFill/>
+        </p:spPr>
+        <p:txBody>
+          <a:bodyPr wrap="square" rtlCol="0">
+            <a:spAutoFit/>
+          </a:bodyPr>
+          <a:lstStyle/>
+          <a:p>
+            <a:r>
+              <a:rPr lang="en-US" sz="2400" dirty="0" smtClean="0"/>
+              <a:t>Request/select benchmark articles</a:t>
+            </a:r>
+            <a:endParaRPr lang="en-US" sz="2400" dirty="0"/>
+          </a:p>
+        </p:txBody>
+      </p:sp>
+      <p:sp>
+        <p:nvSpPr>
+          <p:cNvPr id="77" name="TextBox 76"/>
+          <p:cNvSpPr txBox="1"/>
+          <p:nvPr/>
+        </p:nvSpPr>
+        <p:spPr>
+          <a:xfrm>
+            <a:off x="18469087" y="1747906"/>
+            <a:ext cx="2683006" cy="830997"/>
+          </a:xfrm>
+          <a:prstGeom prst="rect">
+            <a:avLst/>
+          </a:prstGeom>
+          <a:noFill/>
+        </p:spPr>
+        <p:txBody>
+          <a:bodyPr wrap="square" rtlCol="0">
+            <a:spAutoFit/>
+          </a:bodyPr>
+          <a:lstStyle/>
+          <a:p>
+            <a:r>
+              <a:rPr lang="en-US" sz="2400" dirty="0" smtClean="0"/>
+              <a:t>Select authors by influence as experts</a:t>
+            </a:r>
+            <a:endParaRPr lang="en-US" sz="2400" dirty="0"/>
+          </a:p>
+        </p:txBody>
+      </p:sp>
+      <p:cxnSp>
+        <p:nvCxnSpPr>
+          <p:cNvPr id="81" name="Straight Arrow Connector 80"/>
+          <p:cNvCxnSpPr/>
+          <p:nvPr/>
+        </p:nvCxnSpPr>
+        <p:spPr>
+          <a:xfrm>
+            <a:off x="3044349" y="3711074"/>
+            <a:ext cx="1298732" cy="0"/>
+          </a:xfrm>
+          <a:prstGeom prst="straightConnector1">
+            <a:avLst/>
+          </a:prstGeom>
+          <a:ln w="28575" cmpd="sng">
+            <a:solidFill>
+              <a:schemeClr val="tx1"/>
+            </a:solidFill>
+            <a:headEnd type="none"/>
+            <a:tailEnd type="triangle" w="lg" len="lg"/>
+          </a:ln>
+          <a:effectLst/>
+        </p:spPr>
+        <p:style>
+          <a:lnRef idx="2">
+            <a:schemeClr val="accent1"/>
+          </a:lnRef>
+          <a:fillRef idx="0">
+            <a:schemeClr val="accent1"/>
+          </a:fillRef>
+          <a:effectRef idx="1">
+            <a:schemeClr val="accent1"/>
+          </a:effectRef>
+          <a:fontRef idx="minor">
+            <a:schemeClr val="tx1"/>
+          </a:fontRef>
+        </p:style>
+      </p:cxnSp>
+      <p:cxnSp>
+        <p:nvCxnSpPr>
+          <p:cNvPr id="82" name="Straight Arrow Connector 81"/>
+          <p:cNvCxnSpPr/>
+          <p:nvPr/>
+        </p:nvCxnSpPr>
+        <p:spPr>
+          <a:xfrm flipV="1">
+            <a:off x="19708952" y="2692005"/>
+            <a:ext cx="0" cy="1697748"/>
+          </a:xfrm>
+          <a:prstGeom prst="straightConnector1">
+            <a:avLst/>
+          </a:prstGeom>
+          <a:ln w="28575" cmpd="sng">
+            <a:solidFill>
+              <a:schemeClr val="tx1"/>
+            </a:solidFill>
+            <a:headEnd type="none"/>
+            <a:tailEnd type="triangle" w="lg" len="lg"/>
+          </a:ln>
+          <a:effectLst/>
+        </p:spPr>
+        <p:style>
+          <a:lnRef idx="2">
+            <a:schemeClr val="accent1"/>
+          </a:lnRef>
+          <a:fillRef idx="0">
+            <a:schemeClr val="accent1"/>
+          </a:fillRef>
+          <a:effectRef idx="1">
+            <a:schemeClr val="accent1"/>
+          </a:effectRef>
+          <a:fontRef idx="minor">
+            <a:schemeClr val="tx1"/>
+          </a:fontRef>
+        </p:style>
+      </p:cxnSp>
+      <p:cxnSp>
+        <p:nvCxnSpPr>
+          <p:cNvPr id="83" name="Straight Arrow Connector 82"/>
+          <p:cNvCxnSpPr/>
+          <p:nvPr/>
+        </p:nvCxnSpPr>
+        <p:spPr>
+          <a:xfrm>
+            <a:off x="6806104" y="3711074"/>
+            <a:ext cx="1298732" cy="0"/>
+          </a:xfrm>
+          <a:prstGeom prst="straightConnector1">
+            <a:avLst/>
+          </a:prstGeom>
+          <a:ln w="28575" cmpd="sng">
+            <a:solidFill>
+              <a:schemeClr val="tx1"/>
+            </a:solidFill>
+            <a:headEnd type="none"/>
+            <a:tailEnd type="triangle" w="lg" len="lg"/>
+          </a:ln>
+          <a:effectLst/>
+        </p:spPr>
+        <p:style>
+          <a:lnRef idx="2">
+            <a:schemeClr val="accent1"/>
+          </a:lnRef>
+          <a:fillRef idx="0">
+            <a:schemeClr val="accent1"/>
+          </a:fillRef>
+          <a:effectRef idx="1">
+            <a:schemeClr val="accent1"/>
+          </a:effectRef>
+          <a:fontRef idx="minor">
+            <a:schemeClr val="tx1"/>
+          </a:fontRef>
+        </p:style>
+      </p:cxnSp>
+      <p:cxnSp>
+        <p:nvCxnSpPr>
+          <p:cNvPr id="84" name="Straight Arrow Connector 83"/>
+          <p:cNvCxnSpPr/>
+          <p:nvPr/>
+        </p:nvCxnSpPr>
+        <p:spPr>
+          <a:xfrm flipV="1">
+            <a:off x="10864036" y="2692004"/>
+            <a:ext cx="634358" cy="1019070"/>
+          </a:xfrm>
+          <a:prstGeom prst="straightConnector1">
+            <a:avLst/>
+          </a:prstGeom>
+          <a:ln w="28575" cmpd="sng">
+            <a:solidFill>
+              <a:schemeClr val="tx1"/>
+            </a:solidFill>
+            <a:headEnd type="none"/>
+            <a:tailEnd type="triangle" w="lg" len="lg"/>
+          </a:ln>
+          <a:effectLst/>
+        </p:spPr>
+        <p:style>
+          <a:lnRef idx="2">
+            <a:schemeClr val="accent1"/>
+          </a:lnRef>
+          <a:fillRef idx="0">
+            <a:schemeClr val="accent1"/>
+          </a:fillRef>
+          <a:effectRef idx="1">
+            <a:schemeClr val="accent1"/>
+          </a:effectRef>
+          <a:fontRef idx="minor">
+            <a:schemeClr val="tx1"/>
+          </a:fontRef>
+        </p:style>
+      </p:cxnSp>
+      <p:cxnSp>
+        <p:nvCxnSpPr>
+          <p:cNvPr id="86" name="Straight Arrow Connector 85"/>
+          <p:cNvCxnSpPr/>
+          <p:nvPr/>
+        </p:nvCxnSpPr>
+        <p:spPr>
+          <a:xfrm>
+            <a:off x="10831666" y="3711074"/>
+            <a:ext cx="692126" cy="885628"/>
+          </a:xfrm>
+          <a:prstGeom prst="straightConnector1">
+            <a:avLst/>
+          </a:prstGeom>
+          <a:ln w="28575" cmpd="sng">
+            <a:solidFill>
+              <a:schemeClr val="tx1"/>
+            </a:solidFill>
+            <a:headEnd type="none"/>
+            <a:tailEnd type="triangle" w="lg" len="lg"/>
+          </a:ln>
+          <a:effectLst/>
+        </p:spPr>
+        <p:style>
+          <a:lnRef idx="2">
+            <a:schemeClr val="accent1"/>
+          </a:lnRef>
+          <a:fillRef idx="0">
+            <a:schemeClr val="accent1"/>
+          </a:fillRef>
+          <a:effectRef idx="1">
+            <a:schemeClr val="accent1"/>
+          </a:effectRef>
+          <a:fontRef idx="minor">
+            <a:schemeClr val="tx1"/>
+          </a:fontRef>
+        </p:style>
+      </p:cxnSp>
+      <p:cxnSp>
+        <p:nvCxnSpPr>
+          <p:cNvPr id="87" name="Straight Arrow Connector 86"/>
+          <p:cNvCxnSpPr/>
+          <p:nvPr/>
+        </p:nvCxnSpPr>
+        <p:spPr>
+          <a:xfrm>
+            <a:off x="14206798" y="4828532"/>
+            <a:ext cx="1298732" cy="0"/>
+          </a:xfrm>
+          <a:prstGeom prst="straightConnector1">
+            <a:avLst/>
+          </a:prstGeom>
+          <a:ln w="28575" cmpd="sng">
+            <a:solidFill>
+              <a:schemeClr val="tx1"/>
+            </a:solidFill>
+            <a:headEnd type="none"/>
+            <a:tailEnd type="triangle" w="lg" len="lg"/>
+          </a:ln>
+          <a:effectLst/>
+        </p:spPr>
+        <p:style>
+          <a:lnRef idx="2">
+            <a:schemeClr val="accent1"/>
+          </a:lnRef>
+          <a:fillRef idx="0">
+            <a:schemeClr val="accent1"/>
+          </a:fillRef>
+          <a:effectRef idx="1">
+            <a:schemeClr val="accent1"/>
+          </a:effectRef>
+          <a:fontRef idx="minor">
+            <a:schemeClr val="tx1"/>
+          </a:fontRef>
+        </p:style>
+      </p:cxnSp>
+      <p:cxnSp>
+        <p:nvCxnSpPr>
+          <p:cNvPr id="88" name="Straight Arrow Connector 87"/>
+          <p:cNvCxnSpPr/>
+          <p:nvPr/>
+        </p:nvCxnSpPr>
+        <p:spPr>
+          <a:xfrm>
+            <a:off x="17438749" y="4958799"/>
+            <a:ext cx="1298732" cy="0"/>
+          </a:xfrm>
+          <a:prstGeom prst="straightConnector1">
+            <a:avLst/>
+          </a:prstGeom>
+          <a:ln w="28575" cmpd="sng">
+            <a:solidFill>
+              <a:schemeClr val="tx1"/>
+            </a:solidFill>
+            <a:headEnd type="none"/>
+            <a:tailEnd type="triangle" w="lg" len="lg"/>
+          </a:ln>
+          <a:effectLst/>
+        </p:spPr>
+        <p:style>
+          <a:lnRef idx="2">
+            <a:schemeClr val="accent1"/>
+          </a:lnRef>
+          <a:fillRef idx="0">
+            <a:schemeClr val="accent1"/>
+          </a:fillRef>
+          <a:effectRef idx="1">
+            <a:schemeClr val="accent1"/>
+          </a:effectRef>
+          <a:fontRef idx="minor">
+            <a:schemeClr val="tx1"/>
+          </a:fontRef>
+        </p:style>
+      </p:cxnSp>
+      <p:cxnSp>
+        <p:nvCxnSpPr>
+          <p:cNvPr id="89" name="Straight Arrow Connector 88"/>
+          <p:cNvCxnSpPr/>
+          <p:nvPr/>
+        </p:nvCxnSpPr>
+        <p:spPr>
+          <a:xfrm>
+            <a:off x="16419407" y="2222308"/>
+            <a:ext cx="2019087" cy="0"/>
+          </a:xfrm>
+          <a:prstGeom prst="straightConnector1">
+            <a:avLst/>
+          </a:prstGeom>
+          <a:ln w="28575" cmpd="sng">
+            <a:solidFill>
+              <a:schemeClr val="tx1"/>
+            </a:solidFill>
+            <a:headEnd type="none"/>
+            <a:tailEnd type="triangle" w="lg" len="lg"/>
+          </a:ln>
+          <a:effectLst/>
+        </p:spPr>
+        <p:style>
+          <a:lnRef idx="2">
+            <a:schemeClr val="accent1"/>
+          </a:lnRef>
+          <a:fillRef idx="0">
+            <a:schemeClr val="accent1"/>
+          </a:fillRef>
+          <a:effectRef idx="1">
+            <a:schemeClr val="accent1"/>
+          </a:effectRef>
+          <a:fontRef idx="minor">
+            <a:schemeClr val="tx1"/>
+          </a:fontRef>
+        </p:style>
+      </p:cxnSp>
+    </p:spTree>
+    <p:extLst>
+      <p:ext uri="{BB962C8B-B14F-4D97-AF65-F5344CB8AC3E}">
+        <p14:creationId xmlns:p14="http://schemas.microsoft.com/office/powerpoint/2010/main" val="4228063897"/>
       </p:ext>
     </p:extLst>
   </p:cSld>

</xml_diff>